<commit_message>
Final Commit, Small Fix
Remembered to put in 1 screen shot, small fix.
</commit_message>
<xml_diff>
--- a/FinalPPT.pptx
+++ b/FinalPPT.pptx
@@ -129,6 +129,11 @@
       </a:defRPr>
     </a:lvl9pPr>
   </p:defaultTextStyle>
+  <p:extLst>
+    <p:ext uri="{EFAFB233-063F-42B5-8137-9DF3F51BA10A}">
+      <p15:sldGuideLst xmlns:p15="http://schemas.microsoft.com/office/powerpoint/2012/main"/>
+    </p:ext>
+  </p:extLst>
 </p:presentation>
 </file>
 
@@ -214,7 +219,7 @@
           <a:p>
             <a:fld id="{7792C7B7-2AEA-8C43-824C-D58162E854F0}" type="datetimeFigureOut">
               <a:rPr lang="en-US" smtClean="0"/>
-              <a:t>5/2/17</a:t>
+              <a:t>5/3/17</a:t>
             </a:fld>
             <a:endParaRPr lang="en-US"/>
           </a:p>
@@ -727,7 +732,7 @@
           <a:p>
             <a:fld id="{D5988D1A-61BE-5A4B-897A-0B7592155E75}" type="datetime1">
               <a:rPr lang="en-US" smtClean="0"/>
-              <a:t>5/2/17</a:t>
+              <a:t>5/3/17</a:t>
             </a:fld>
             <a:endParaRPr lang="en-US" dirty="0"/>
           </a:p>
@@ -1081,7 +1086,7 @@
           <a:p>
             <a:fld id="{2130579A-39DE-8D42-A2C4-C65E58D5AB55}" type="datetime1">
               <a:rPr lang="en-US" smtClean="0"/>
-              <a:t>5/2/17</a:t>
+              <a:t>5/3/17</a:t>
             </a:fld>
             <a:endParaRPr lang="en-US" dirty="0"/>
           </a:p>
@@ -1261,7 +1266,7 @@
           <a:p>
             <a:fld id="{DB390CCC-25CD-514B-BE5E-B52621275F01}" type="datetime1">
               <a:rPr lang="en-US" smtClean="0"/>
-              <a:t>5/2/17</a:t>
+              <a:t>5/3/17</a:t>
             </a:fld>
             <a:endParaRPr lang="en-US" dirty="0"/>
           </a:p>
@@ -1467,7 +1472,7 @@
           <a:p>
             <a:fld id="{B88D9A15-072E-DA43-A46F-EDDAF29B9656}" type="datetime1">
               <a:rPr lang="en-US" smtClean="0"/>
-              <a:t>5/2/17</a:t>
+              <a:t>5/3/17</a:t>
             </a:fld>
             <a:endParaRPr lang="en-US" dirty="0"/>
           </a:p>
@@ -1798,7 +1803,7 @@
           <a:p>
             <a:fld id="{0E37C0BE-C019-2447-810E-D964187E56E9}" type="datetime1">
               <a:rPr lang="en-US" smtClean="0"/>
-              <a:t>5/2/17</a:t>
+              <a:t>5/3/17</a:t>
             </a:fld>
             <a:endParaRPr lang="en-US" dirty="0"/>
           </a:p>
@@ -2192,7 +2197,7 @@
           <a:p>
             <a:fld id="{C56ABDB6-904F-784D-AB61-7F0E92A93357}" type="datetime1">
               <a:rPr lang="en-US" smtClean="0"/>
-              <a:t>5/2/17</a:t>
+              <a:t>5/3/17</a:t>
             </a:fld>
             <a:endParaRPr lang="en-US" dirty="0"/>
           </a:p>
@@ -2669,7 +2674,7 @@
           <a:p>
             <a:fld id="{3A1ECF53-AEB4-DD4D-98D3-A1D1BA4FEECD}" type="datetime1">
               <a:rPr lang="en-US" smtClean="0"/>
-              <a:t>5/2/17</a:t>
+              <a:t>5/3/17</a:t>
             </a:fld>
             <a:endParaRPr lang="en-US" dirty="0"/>
           </a:p>
@@ -2787,7 +2792,7 @@
           <a:p>
             <a:fld id="{4DDFE2D2-7618-5F49-95C3-80AB371A8C7B}" type="datetime1">
               <a:rPr lang="en-US" smtClean="0"/>
-              <a:t>5/2/17</a:t>
+              <a:t>5/3/17</a:t>
             </a:fld>
             <a:endParaRPr lang="en-US" dirty="0"/>
           </a:p>
@@ -2906,7 +2911,7 @@
           <a:p>
             <a:fld id="{479FB488-B2B3-7B4B-8FD6-A19C878B6672}" type="datetime1">
               <a:rPr lang="en-US" smtClean="0"/>
-              <a:t>5/2/17</a:t>
+              <a:t>5/3/17</a:t>
             </a:fld>
             <a:endParaRPr lang="en-US" dirty="0"/>
           </a:p>
@@ -3252,7 +3257,7 @@
           <a:p>
             <a:fld id="{C0FDC1F1-B7F5-4245-8172-267356A552FE}" type="datetime1">
               <a:rPr lang="en-US" smtClean="0"/>
-              <a:t>5/2/17</a:t>
+              <a:t>5/3/17</a:t>
             </a:fld>
             <a:endParaRPr lang="en-US" dirty="0"/>
           </a:p>
@@ -3640,7 +3645,7 @@
           <a:p>
             <a:fld id="{8C161ADE-4FD3-D34D-8338-C48D7597F67C}" type="datetime1">
               <a:rPr lang="en-US" smtClean="0"/>
-              <a:t>5/2/17</a:t>
+              <a:t>5/3/17</a:t>
             </a:fld>
             <a:endParaRPr lang="en-US" dirty="0"/>
           </a:p>
@@ -3915,7 +3920,7 @@
           <a:p>
             <a:fld id="{CEB72D8B-D2E0-6D40-8828-84D06AC90E08}" type="datetime1">
               <a:rPr lang="en-US" smtClean="0"/>
-              <a:t>5/2/17</a:t>
+              <a:t>5/3/17</a:t>
             </a:fld>
             <a:endParaRPr lang="en-US" dirty="0"/>
           </a:p>
@@ -6258,6 +6263,10 @@
               <a:rPr lang="en-US" dirty="0" smtClean="0"/>
               <a:t>UPDATE Slots </a:t>
             </a:r>
+            <a:r>
+              <a:rPr lang="en-US" dirty="0" smtClean="0"/>
+              <a:t/>
+            </a:r>
             <a:br>
               <a:rPr lang="en-US" dirty="0" smtClean="0"/>
             </a:br>
@@ -6360,6 +6369,385 @@
               <a:t>14</a:t>
             </a:fld>
             <a:endParaRPr lang="en-US" dirty="0"/>
+          </a:p>
+        </p:txBody>
+      </p:sp>
+      <p:sp>
+        <p:nvSpPr>
+          <p:cNvPr id="5" name="TextBox 4"/>
+          <p:cNvSpPr txBox="1"/>
+          <p:nvPr/>
+        </p:nvSpPr>
+        <p:spPr>
+          <a:xfrm>
+            <a:off x="9062838" y="2856296"/>
+            <a:ext cx="2109232" cy="384721"/>
+          </a:xfrm>
+          <a:prstGeom prst="rect">
+            <a:avLst/>
+          </a:prstGeom>
+          <a:noFill/>
+        </p:spPr>
+        <p:txBody>
+          <a:bodyPr wrap="none" rtlCol="0">
+            <a:spAutoFit/>
+          </a:bodyPr>
+          <a:lstStyle/>
+          <a:p>
+            <a:r>
+              <a:rPr lang="en-US" sz="1900" dirty="0" smtClean="0">
+                <a:solidFill>
+                  <a:schemeClr val="tx2"/>
+                </a:solidFill>
+              </a:rPr>
+              <a:t>Before Transaction</a:t>
+            </a:r>
+            <a:endParaRPr lang="en-US" sz="1900" dirty="0">
+              <a:solidFill>
+                <a:schemeClr val="tx2"/>
+              </a:solidFill>
+            </a:endParaRPr>
+          </a:p>
+        </p:txBody>
+      </p:sp>
+      <p:pic>
+        <p:nvPicPr>
+          <p:cNvPr id="6" name="Picture 5"/>
+          <p:cNvPicPr>
+            <a:picLocks noChangeAspect="1"/>
+          </p:cNvPicPr>
+          <p:nvPr/>
+        </p:nvPicPr>
+        <p:blipFill>
+          <a:blip r:embed="rId2">
+            <a:extLst>
+              <a:ext uri="{28A0092B-C50C-407E-A947-70E740481C1C}">
+                <a14:useLocalDpi xmlns:a14="http://schemas.microsoft.com/office/drawing/2010/main" val="0"/>
+              </a:ext>
+            </a:extLst>
+          </a:blip>
+          <a:stretch>
+            <a:fillRect/>
+          </a:stretch>
+        </p:blipFill>
+        <p:spPr>
+          <a:xfrm>
+            <a:off x="8528366" y="3281860"/>
+            <a:ext cx="3178175" cy="948372"/>
+          </a:xfrm>
+          <a:prstGeom prst="rect">
+            <a:avLst/>
+          </a:prstGeom>
+        </p:spPr>
+      </p:pic>
+      <p:sp>
+        <p:nvSpPr>
+          <p:cNvPr id="7" name="TextBox 6"/>
+          <p:cNvSpPr txBox="1"/>
+          <p:nvPr/>
+        </p:nvSpPr>
+        <p:spPr>
+          <a:xfrm>
+            <a:off x="9165235" y="4343405"/>
+            <a:ext cx="1921488" cy="384721"/>
+          </a:xfrm>
+          <a:prstGeom prst="rect">
+            <a:avLst/>
+          </a:prstGeom>
+          <a:noFill/>
+        </p:spPr>
+        <p:txBody>
+          <a:bodyPr wrap="none" rtlCol="0">
+            <a:spAutoFit/>
+          </a:bodyPr>
+          <a:lstStyle/>
+          <a:p>
+            <a:r>
+              <a:rPr lang="en-US" sz="1900" smtClean="0">
+                <a:solidFill>
+                  <a:schemeClr val="tx2"/>
+                </a:solidFill>
+              </a:rPr>
+              <a:t>After Transaction</a:t>
+            </a:r>
+            <a:endParaRPr lang="en-US" sz="1900" dirty="0">
+              <a:solidFill>
+                <a:schemeClr val="tx2"/>
+              </a:solidFill>
+            </a:endParaRPr>
+          </a:p>
+        </p:txBody>
+      </p:sp>
+      <p:pic>
+        <p:nvPicPr>
+          <p:cNvPr id="8" name="Picture 7"/>
+          <p:cNvPicPr>
+            <a:picLocks noChangeAspect="1"/>
+          </p:cNvPicPr>
+          <p:nvPr/>
+        </p:nvPicPr>
+        <p:blipFill>
+          <a:blip r:embed="rId3">
+            <a:extLst>
+              <a:ext uri="{28A0092B-C50C-407E-A947-70E740481C1C}">
+                <a14:useLocalDpi xmlns:a14="http://schemas.microsoft.com/office/drawing/2010/main" val="0"/>
+              </a:ext>
+            </a:extLst>
+          </a:blip>
+          <a:stretch>
+            <a:fillRect/>
+          </a:stretch>
+        </p:blipFill>
+        <p:spPr>
+          <a:xfrm>
+            <a:off x="8528366" y="4790878"/>
+            <a:ext cx="3219505" cy="949268"/>
+          </a:xfrm>
+          <a:prstGeom prst="rect">
+            <a:avLst/>
+          </a:prstGeom>
+        </p:spPr>
+      </p:pic>
+      <p:sp>
+        <p:nvSpPr>
+          <p:cNvPr id="9" name="TextBox 8"/>
+          <p:cNvSpPr txBox="1"/>
+          <p:nvPr/>
+        </p:nvSpPr>
+        <p:spPr>
+          <a:xfrm>
+            <a:off x="4807828" y="6100703"/>
+            <a:ext cx="7441076" cy="584775"/>
+          </a:xfrm>
+          <a:prstGeom prst="rect">
+            <a:avLst/>
+          </a:prstGeom>
+          <a:noFill/>
+        </p:spPr>
+        <p:txBody>
+          <a:bodyPr wrap="none" rtlCol="0">
+            <a:spAutoFit/>
+          </a:bodyPr>
+          <a:lstStyle/>
+          <a:p>
+            <a:r>
+              <a:rPr lang="en-US" sz="1600" dirty="0">
+                <a:solidFill>
+                  <a:schemeClr val="tx2"/>
+                </a:solidFill>
+              </a:rPr>
+              <a:t>INSERT INTO Transactions(</a:t>
+            </a:r>
+            <a:r>
+              <a:rPr lang="en-US" sz="1600" dirty="0" err="1">
+                <a:solidFill>
+                  <a:schemeClr val="tx2"/>
+                </a:solidFill>
+              </a:rPr>
+              <a:t>transID</a:t>
+            </a:r>
+            <a:r>
+              <a:rPr lang="en-US" sz="1600" dirty="0">
+                <a:solidFill>
+                  <a:schemeClr val="tx2"/>
+                </a:solidFill>
+              </a:rPr>
+              <a:t>, </a:t>
+            </a:r>
+            <a:r>
+              <a:rPr lang="en-US" sz="1600" dirty="0" err="1">
+                <a:solidFill>
+                  <a:schemeClr val="tx2"/>
+                </a:solidFill>
+              </a:rPr>
+              <a:t>parkingID</a:t>
+            </a:r>
+            <a:r>
+              <a:rPr lang="en-US" sz="1600" dirty="0">
+                <a:solidFill>
+                  <a:schemeClr val="tx2"/>
+                </a:solidFill>
+              </a:rPr>
+              <a:t>, </a:t>
+            </a:r>
+            <a:r>
+              <a:rPr lang="en-US" sz="1600" dirty="0" err="1">
+                <a:solidFill>
+                  <a:schemeClr val="tx2"/>
+                </a:solidFill>
+              </a:rPr>
+              <a:t>slotID</a:t>
+            </a:r>
+            <a:r>
+              <a:rPr lang="en-US" sz="1600" dirty="0">
+                <a:solidFill>
+                  <a:schemeClr val="tx2"/>
+                </a:solidFill>
+              </a:rPr>
+              <a:t>, </a:t>
+            </a:r>
+            <a:r>
+              <a:rPr lang="en-US" sz="1600" dirty="0" err="1">
+                <a:solidFill>
+                  <a:schemeClr val="tx2"/>
+                </a:solidFill>
+              </a:rPr>
+              <a:t>userID</a:t>
+            </a:r>
+            <a:r>
+              <a:rPr lang="en-US" sz="1600" dirty="0">
+                <a:solidFill>
+                  <a:schemeClr val="tx2"/>
+                </a:solidFill>
+              </a:rPr>
+              <a:t>, amount, </a:t>
+            </a:r>
+            <a:r>
+              <a:rPr lang="en-US" sz="1600" dirty="0" err="1">
+                <a:solidFill>
+                  <a:schemeClr val="tx2"/>
+                </a:solidFill>
+              </a:rPr>
+              <a:t>time_paid_for</a:t>
+            </a:r>
+            <a:r>
+              <a:rPr lang="en-US" sz="1600" dirty="0" smtClean="0">
+                <a:solidFill>
+                  <a:schemeClr val="tx2"/>
+                </a:solidFill>
+              </a:rPr>
+              <a:t>)</a:t>
+            </a:r>
+          </a:p>
+          <a:p>
+            <a:r>
+              <a:rPr lang="en-US" sz="1600" dirty="0" smtClean="0">
+                <a:solidFill>
+                  <a:schemeClr val="tx2"/>
+                </a:solidFill>
+              </a:rPr>
+              <a:t>    </a:t>
+            </a:r>
+            <a:r>
+              <a:rPr lang="en-US" sz="1600" dirty="0">
+                <a:solidFill>
+                  <a:schemeClr val="tx2"/>
+                </a:solidFill>
+              </a:rPr>
+              <a:t>VALUES('T010', 'PA015', 'S135', 'U011', 3.00, '3 hours');</a:t>
+            </a:r>
+          </a:p>
+        </p:txBody>
+      </p:sp>
+      <p:sp>
+        <p:nvSpPr>
+          <p:cNvPr id="10" name="TextBox 9"/>
+          <p:cNvSpPr txBox="1"/>
+          <p:nvPr/>
+        </p:nvSpPr>
+        <p:spPr>
+          <a:xfrm>
+            <a:off x="6836033" y="5772148"/>
+            <a:ext cx="3002425" cy="369332"/>
+          </a:xfrm>
+          <a:prstGeom prst="rect">
+            <a:avLst/>
+          </a:prstGeom>
+          <a:noFill/>
+        </p:spPr>
+        <p:txBody>
+          <a:bodyPr wrap="none" rtlCol="0">
+            <a:spAutoFit/>
+          </a:bodyPr>
+          <a:lstStyle/>
+          <a:p>
+            <a:r>
+              <a:rPr lang="en-US" dirty="0" smtClean="0">
+                <a:solidFill>
+                  <a:schemeClr val="tx2"/>
+                </a:solidFill>
+              </a:rPr>
+              <a:t>Transaction Insert Statement</a:t>
+            </a:r>
+            <a:endParaRPr lang="en-US" dirty="0">
+              <a:solidFill>
+                <a:schemeClr val="tx2"/>
+              </a:solidFill>
+            </a:endParaRPr>
+          </a:p>
+        </p:txBody>
+      </p:sp>
+      <p:sp>
+        <p:nvSpPr>
+          <p:cNvPr id="11" name="TextBox 10"/>
+          <p:cNvSpPr txBox="1"/>
+          <p:nvPr/>
+        </p:nvSpPr>
+        <p:spPr>
+          <a:xfrm>
+            <a:off x="9062838" y="2182639"/>
+            <a:ext cx="2948840" cy="738664"/>
+          </a:xfrm>
+          <a:prstGeom prst="rect">
+            <a:avLst/>
+          </a:prstGeom>
+          <a:noFill/>
+        </p:spPr>
+        <p:txBody>
+          <a:bodyPr wrap="square" rtlCol="0">
+            <a:spAutoFit/>
+          </a:bodyPr>
+          <a:lstStyle/>
+          <a:p>
+            <a:r>
+              <a:rPr lang="en-US" sz="1400" dirty="0" smtClean="0">
+                <a:solidFill>
+                  <a:schemeClr val="tx2"/>
+                </a:solidFill>
+              </a:rPr>
+              <a:t>SELECT *</a:t>
+            </a:r>
+          </a:p>
+          <a:p>
+            <a:r>
+              <a:rPr lang="en-US" sz="1400" dirty="0" smtClean="0">
+                <a:solidFill>
+                  <a:schemeClr val="tx2"/>
+                </a:solidFill>
+              </a:rPr>
+              <a:t>FROM Slots</a:t>
+            </a:r>
+          </a:p>
+          <a:p>
+            <a:r>
+              <a:rPr lang="en-US" sz="1400" dirty="0" smtClean="0">
+                <a:solidFill>
+                  <a:schemeClr val="tx2"/>
+                </a:solidFill>
+              </a:rPr>
+              <a:t>WHERE </a:t>
+            </a:r>
+            <a:r>
+              <a:rPr lang="en-US" sz="1400" dirty="0" err="1" smtClean="0">
+                <a:solidFill>
+                  <a:schemeClr val="tx2"/>
+                </a:solidFill>
+              </a:rPr>
+              <a:t>parkingID</a:t>
+            </a:r>
+            <a:r>
+              <a:rPr lang="en-US" sz="1400" dirty="0" smtClean="0">
+                <a:solidFill>
+                  <a:schemeClr val="tx2"/>
+                </a:solidFill>
+              </a:rPr>
+              <a:t> = ‘PA015’</a:t>
+            </a:r>
+            <a:endParaRPr lang="en-US" sz="1400" dirty="0">
+              <a:solidFill>
+                <a:schemeClr val="tx2"/>
+              </a:solidFill>
+            </a:endParaRPr>
           </a:p>
         </p:txBody>
       </p:sp>

</xml_diff>